<commit_message>
Updated README in Java Crash Course
</commit_message>
<xml_diff>
--- a/Crash Course - Python3/Python Crash Course.pptx
+++ b/Crash Course - Python3/Python Crash Course.pptx
@@ -119,13 +119,45 @@
 <file path=ppt/revisionInfo.xml><?xml version="1.0" encoding="utf-8"?>
 <p1510:revInfo xmlns:a="http://schemas.openxmlformats.org/drawingml/2006/main" xmlns:r="http://schemas.openxmlformats.org/officeDocument/2006/relationships" xmlns:p1510="http://schemas.microsoft.com/office/powerpoint/2015/10/main">
   <p1510:revLst>
-    <p1510:client id="{69454E94-6CB5-4D22-90E7-E9958DD8FD48}" v="9" dt="2020-12-14T07:59:10.335"/>
+    <p1510:client id="{9B7E9B8E-33BF-40EC-9BAD-6B1FFB540BDC}" v="1" dt="2021-07-09T15:09:07.883"/>
   </p1510:revLst>
 </p1510:revInfo>
 </file>
 
 <file path=ppt/changesInfos/changesInfo1.xml><?xml version="1.0" encoding="utf-8"?>
 <pc:chgInfo xmlns:a="http://schemas.openxmlformats.org/drawingml/2006/main" xmlns:r="http://schemas.openxmlformats.org/officeDocument/2006/relationships" xmlns:ac="http://schemas.microsoft.com/office/drawing/2013/main/command" xmlns:pc="http://schemas.microsoft.com/office/powerpoint/2013/main/command">
+  <pc:docChgLst>
+    <pc:chgData name="Koh Si Xing" userId="099b7444-d265-472a-b3cb-985c4b9c9d9d" providerId="ADAL" clId="{9B7E9B8E-33BF-40EC-9BAD-6B1FFB540BDC}"/>
+    <pc:docChg chg="modSld">
+      <pc:chgData name="Koh Si Xing" userId="099b7444-d265-472a-b3cb-985c4b9c9d9d" providerId="ADAL" clId="{9B7E9B8E-33BF-40EC-9BAD-6B1FFB540BDC}" dt="2021-07-09T15:09:07.883" v="9"/>
+      <pc:docMkLst>
+        <pc:docMk/>
+      </pc:docMkLst>
+      <pc:sldChg chg="modSp mod">
+        <pc:chgData name="Koh Si Xing" userId="099b7444-d265-472a-b3cb-985c4b9c9d9d" providerId="ADAL" clId="{9B7E9B8E-33BF-40EC-9BAD-6B1FFB540BDC}" dt="2021-07-09T15:09:07.883" v="9"/>
+        <pc:sldMkLst>
+          <pc:docMk/>
+          <pc:sldMk cId="2639583962" sldId="261"/>
+        </pc:sldMkLst>
+        <pc:graphicFrameChg chg="mod">
+          <ac:chgData name="Koh Si Xing" userId="099b7444-d265-472a-b3cb-985c4b9c9d9d" providerId="ADAL" clId="{9B7E9B8E-33BF-40EC-9BAD-6B1FFB540BDC}" dt="2021-07-09T15:09:07.883" v="9"/>
+          <ac:graphicFrameMkLst>
+            <pc:docMk/>
+            <pc:sldMk cId="2639583962" sldId="261"/>
+            <ac:graphicFrameMk id="9" creationId="{25C13F97-3B4E-4214-B3ED-C56B09F362CC}"/>
+          </ac:graphicFrameMkLst>
+        </pc:graphicFrameChg>
+        <pc:graphicFrameChg chg="modGraphic">
+          <ac:chgData name="Koh Si Xing" userId="099b7444-d265-472a-b3cb-985c4b9c9d9d" providerId="ADAL" clId="{9B7E9B8E-33BF-40EC-9BAD-6B1FFB540BDC}" dt="2021-07-09T15:08:51.368" v="8" actId="20577"/>
+          <ac:graphicFrameMkLst>
+            <pc:docMk/>
+            <pc:sldMk cId="2639583962" sldId="261"/>
+            <ac:graphicFrameMk id="10" creationId="{78DD98DD-09B1-47CB-889C-0A2FBDBF6567}"/>
+          </ac:graphicFrameMkLst>
+        </pc:graphicFrameChg>
+      </pc:sldChg>
+    </pc:docChg>
+  </pc:docChgLst>
   <pc:docChgLst>
     <pc:chgData name="Koh Si Xing" userId="099b7444-d265-472a-b3cb-985c4b9c9d9d" providerId="ADAL" clId="{69454E94-6CB5-4D22-90E7-E9958DD8FD48}"/>
     <pc:docChg chg="undo redo custSel modSld">
@@ -838,7 +870,7 @@
           <a:p>
             <a:fld id="{75481818-5ABF-4654-8992-212D25648425}" type="datetimeFigureOut">
               <a:rPr lang="en-SG" smtClean="0"/>
-              <a:t>14/12/2020</a:t>
+              <a:t>9/7/2021</a:t>
             </a:fld>
             <a:endParaRPr lang="en-SG"/>
           </a:p>
@@ -1038,7 +1070,7 @@
           <a:p>
             <a:fld id="{75481818-5ABF-4654-8992-212D25648425}" type="datetimeFigureOut">
               <a:rPr lang="en-SG" smtClean="0"/>
-              <a:t>14/12/2020</a:t>
+              <a:t>9/7/2021</a:t>
             </a:fld>
             <a:endParaRPr lang="en-SG"/>
           </a:p>
@@ -1248,7 +1280,7 @@
           <a:p>
             <a:fld id="{75481818-5ABF-4654-8992-212D25648425}" type="datetimeFigureOut">
               <a:rPr lang="en-SG" smtClean="0"/>
-              <a:t>14/12/2020</a:t>
+              <a:t>9/7/2021</a:t>
             </a:fld>
             <a:endParaRPr lang="en-SG"/>
           </a:p>
@@ -1448,7 +1480,7 @@
           <a:p>
             <a:fld id="{75481818-5ABF-4654-8992-212D25648425}" type="datetimeFigureOut">
               <a:rPr lang="en-SG" smtClean="0"/>
-              <a:t>14/12/2020</a:t>
+              <a:t>9/7/2021</a:t>
             </a:fld>
             <a:endParaRPr lang="en-SG"/>
           </a:p>
@@ -1724,7 +1756,7 @@
           <a:p>
             <a:fld id="{75481818-5ABF-4654-8992-212D25648425}" type="datetimeFigureOut">
               <a:rPr lang="en-SG" smtClean="0"/>
-              <a:t>14/12/2020</a:t>
+              <a:t>9/7/2021</a:t>
             </a:fld>
             <a:endParaRPr lang="en-SG"/>
           </a:p>
@@ -1992,7 +2024,7 @@
           <a:p>
             <a:fld id="{75481818-5ABF-4654-8992-212D25648425}" type="datetimeFigureOut">
               <a:rPr lang="en-SG" smtClean="0"/>
-              <a:t>14/12/2020</a:t>
+              <a:t>9/7/2021</a:t>
             </a:fld>
             <a:endParaRPr lang="en-SG"/>
           </a:p>
@@ -2407,7 +2439,7 @@
           <a:p>
             <a:fld id="{75481818-5ABF-4654-8992-212D25648425}" type="datetimeFigureOut">
               <a:rPr lang="en-SG" smtClean="0"/>
-              <a:t>14/12/2020</a:t>
+              <a:t>9/7/2021</a:t>
             </a:fld>
             <a:endParaRPr lang="en-SG"/>
           </a:p>
@@ -2549,7 +2581,7 @@
           <a:p>
             <a:fld id="{75481818-5ABF-4654-8992-212D25648425}" type="datetimeFigureOut">
               <a:rPr lang="en-SG" smtClean="0"/>
-              <a:t>14/12/2020</a:t>
+              <a:t>9/7/2021</a:t>
             </a:fld>
             <a:endParaRPr lang="en-SG"/>
           </a:p>
@@ -2662,7 +2694,7 @@
           <a:p>
             <a:fld id="{75481818-5ABF-4654-8992-212D25648425}" type="datetimeFigureOut">
               <a:rPr lang="en-SG" smtClean="0"/>
-              <a:t>14/12/2020</a:t>
+              <a:t>9/7/2021</a:t>
             </a:fld>
             <a:endParaRPr lang="en-SG"/>
           </a:p>
@@ -2975,7 +3007,7 @@
           <a:p>
             <a:fld id="{75481818-5ABF-4654-8992-212D25648425}" type="datetimeFigureOut">
               <a:rPr lang="en-SG" smtClean="0"/>
-              <a:t>14/12/2020</a:t>
+              <a:t>9/7/2021</a:t>
             </a:fld>
             <a:endParaRPr lang="en-SG"/>
           </a:p>
@@ -3264,7 +3296,7 @@
           <a:p>
             <a:fld id="{75481818-5ABF-4654-8992-212D25648425}" type="datetimeFigureOut">
               <a:rPr lang="en-SG" smtClean="0"/>
-              <a:t>14/12/2020</a:t>
+              <a:t>9/7/2021</a:t>
             </a:fld>
             <a:endParaRPr lang="en-SG"/>
           </a:p>
@@ -3516,7 +3548,7 @@
           <a:p>
             <a:fld id="{75481818-5ABF-4654-8992-212D25648425}" type="datetimeFigureOut">
               <a:rPr lang="en-SG" smtClean="0"/>
-              <a:t>14/12/2020</a:t>
+              <a:t>9/7/2021</a:t>
             </a:fld>
             <a:endParaRPr lang="en-SG"/>
           </a:p>
@@ -7399,7 +7431,7 @@
           <p:nvPr>
             <p:extLst>
               <p:ext uri="{D42A27DB-BD31-4B8C-83A1-F6EECF244321}">
-                <p14:modId xmlns:p14="http://schemas.microsoft.com/office/powerpoint/2010/main" val="234444565"/>
+                <p14:modId xmlns:p14="http://schemas.microsoft.com/office/powerpoint/2010/main" val="2670978855"/>
               </p:ext>
             </p:extLst>
           </p:nvPr>
@@ -7691,21 +7723,18 @@
                     </a:p>
                     <a:p>
                       <a:r>
-                        <a:rPr lang="en-SG" dirty="0" err="1">
+                        <a:rPr lang="en-SG">
                           <a:solidFill>
                             <a:srgbClr val="FDC44D"/>
                           </a:solidFill>
                         </a:rPr>
-                        <a:t>toString</a:t>
+                        <a:t>__.str__(): str</a:t>
                       </a:r>
-                      <a:r>
-                        <a:rPr lang="en-SG" dirty="0">
-                          <a:solidFill>
-                            <a:srgbClr val="FDC44D"/>
-                          </a:solidFill>
-                        </a:rPr>
-                        <a:t>(self): str</a:t>
-                      </a:r>
+                      <a:endParaRPr lang="en-SG" dirty="0">
+                        <a:solidFill>
+                          <a:srgbClr val="FDC44D"/>
+                        </a:solidFill>
+                      </a:endParaRPr>
                     </a:p>
                   </a:txBody>
                   <a:tcPr>
@@ -7780,7 +7809,7 @@
           <p:nvPr>
             <p:extLst>
               <p:ext uri="{D42A27DB-BD31-4B8C-83A1-F6EECF244321}">
-                <p14:modId xmlns:p14="http://schemas.microsoft.com/office/powerpoint/2010/main" val="3630555814"/>
+                <p14:modId xmlns:p14="http://schemas.microsoft.com/office/powerpoint/2010/main" val="377621834"/>
               </p:ext>
             </p:extLst>
           </p:nvPr>
@@ -8014,20 +8043,12 @@
                     </a:p>
                     <a:p>
                       <a:r>
-                        <a:rPr lang="en-SG" dirty="0" err="1">
-                          <a:solidFill>
-                            <a:srgbClr val="FDC44D"/>
-                          </a:solidFill>
-                        </a:rPr>
-                        <a:t>toString</a:t>
-                      </a:r>
-                      <a:r>
                         <a:rPr lang="en-SG" dirty="0">
                           <a:solidFill>
                             <a:srgbClr val="FDC44D"/>
                           </a:solidFill>
                         </a:rPr>
-                        <a:t>(self): str</a:t>
+                        <a:t>__.str__(): str</a:t>
                       </a:r>
                     </a:p>
                   </a:txBody>

</xml_diff>